<commit_message>
clean up pptx text
</commit_message>
<xml_diff>
--- a/presentations/jobs/JobOpenings_SingleSlide.pptx
+++ b/presentations/jobs/JobOpenings_SingleSlide.pptx
@@ -5362,11 +5362,7 @@
             </a:pPr>
             <a:r>
               <a:rPr lang="en-US" sz="2000" b="1" dirty="0" smtClean="0"/>
-              <a:t>Current </a:t>
-            </a:r>
-            <a:r>
-              <a:rPr lang="en-US" sz="2000" b="1" dirty="0" smtClean="0"/>
-              <a:t>Job Openings:</a:t>
+              <a:t>Current Job Openings:</a:t>
             </a:r>
           </a:p>
           <a:p>
@@ -5423,11 +5419,7 @@
             </a:r>
             <a:r>
               <a:rPr lang="en-US" dirty="0" smtClean="0"/>
-              <a:t> </a:t>
-            </a:r>
-            <a:r>
-              <a:rPr lang="en-US" dirty="0" smtClean="0"/>
-              <a:t>Development, Quality and automation</a:t>
+              <a:t> Development, Quality and automation</a:t>
             </a:r>
             <a:endParaRPr lang="en-US" dirty="0"/>
           </a:p>

</xml_diff>

<commit_message>
put the email up top
</commit_message>
<xml_diff>
--- a/presentations/jobs/JobOpenings_SingleSlide.pptx
+++ b/presentations/jobs/JobOpenings_SingleSlide.pptx
@@ -5312,7 +5312,7 @@
         </p:nvSpPr>
         <p:spPr>
           <a:xfrm>
-            <a:off x="228600" y="990600"/>
+            <a:off x="228600" y="1382838"/>
             <a:ext cx="8686800" cy="4547162"/>
           </a:xfrm>
         </p:spPr>
@@ -5352,7 +5352,11 @@
             </a:r>
             <a:r>
               <a:rPr lang="en-US" sz="2000" b="1" dirty="0"/>
-              <a:t>), a passion for making the web a better place, strong communication skills, and top-notch development chops..</a:t>
+              <a:t>), a passion for making the web a better place, strong communication skills, and top-notch development chops</a:t>
+            </a:r>
+            <a:r>
+              <a:rPr lang="en-US" sz="2000" b="1" dirty="0" smtClean="0"/>
+              <a:t>.</a:t>
             </a:r>
             <a:endParaRPr lang="en-US" sz="2000" b="1" dirty="0" smtClean="0"/>
           </a:p>
@@ -5504,8 +5508,8 @@
         </p:nvSpPr>
         <p:spPr>
           <a:xfrm>
-            <a:off x="93371" y="6004697"/>
-            <a:ext cx="3380269" cy="369332"/>
+            <a:off x="2679931" y="933862"/>
+            <a:ext cx="3781798" cy="400110"/>
           </a:xfrm>
           <a:prstGeom prst="rect">
             <a:avLst/>
@@ -5519,10 +5523,10 @@
           <a:lstStyle/>
           <a:p>
             <a:r>
-              <a:rPr lang="en-US" dirty="0" err="1" smtClean="0"/>
+              <a:rPr lang="en-US" sz="2000" b="1" dirty="0" err="1" smtClean="0"/>
               <a:t>WebPlatformJobs@adobe.com</a:t>
             </a:r>
-            <a:endParaRPr lang="en-US" dirty="0"/>
+            <a:endParaRPr lang="en-US" sz="2000" b="1" dirty="0"/>
           </a:p>
         </p:txBody>
       </p:sp>
@@ -5534,8 +5538,8 @@
         </p:nvSpPr>
         <p:spPr>
           <a:xfrm>
-            <a:off x="5680353" y="5680828"/>
-            <a:ext cx="3380269" cy="369332"/>
+            <a:off x="74702" y="5998339"/>
+            <a:ext cx="2010615" cy="369332"/>
           </a:xfrm>
           <a:prstGeom prst="rect">
             <a:avLst/>
@@ -5548,7 +5552,6 @@
           </a:bodyPr>
           <a:lstStyle/>
           <a:p>
-            <a:pPr algn="r"/>
             <a:r>
               <a:rPr lang="en-US" dirty="0" err="1"/>
               <a:t>h</a:t>

</xml_diff>

<commit_message>
add pretty logos to pptx
</commit_message>
<xml_diff>
--- a/presentations/jobs/JobOpenings_SingleSlide.pptx
+++ b/presentations/jobs/JobOpenings_SingleSlide.pptx
@@ -5443,8 +5443,13 @@
             </a:r>
             <a:r>
               <a:rPr lang="en-US" dirty="0" smtClean="0"/>
-              <a:t> Development</a:t>
+              <a:t> </a:t>
             </a:r>
+            <a:r>
+              <a:rPr lang="en-US" dirty="0" smtClean="0"/>
+              <a:t>Development</a:t>
+            </a:r>
+            <a:endParaRPr lang="en-US" dirty="0" smtClean="0"/>
           </a:p>
           <a:p>
             <a:pPr lvl="1">
@@ -5599,6 +5604,66 @@
           </a:p>
         </p:txBody>
       </p:sp>
+      <p:pic>
+        <p:nvPicPr>
+          <p:cNvPr id="8" name="Picture 7" descr="Webkit_Logo.png"/>
+          <p:cNvPicPr>
+            <a:picLocks noChangeAspect="1"/>
+          </p:cNvPicPr>
+          <p:nvPr/>
+        </p:nvPicPr>
+        <p:blipFill>
+          <a:blip r:embed="rId2">
+            <a:extLst>
+              <a:ext uri="{28A0092B-C50C-407E-A947-70E740481C1C}">
+                <a14:useLocalDpi xmlns:a14="http://schemas.microsoft.com/office/drawing/2010/main" val="0"/>
+              </a:ext>
+            </a:extLst>
+          </a:blip>
+          <a:stretch>
+            <a:fillRect/>
+          </a:stretch>
+        </p:blipFill>
+        <p:spPr>
+          <a:xfrm>
+            <a:off x="7377623" y="4884067"/>
+            <a:ext cx="1307553" cy="1058206"/>
+          </a:xfrm>
+          <a:prstGeom prst="rect">
+            <a:avLst/>
+          </a:prstGeom>
+        </p:spPr>
+      </p:pic>
+      <p:pic>
+        <p:nvPicPr>
+          <p:cNvPr id="9" name="Picture 8" descr="HTML5_Badge_128.png"/>
+          <p:cNvPicPr>
+            <a:picLocks noChangeAspect="1"/>
+          </p:cNvPicPr>
+          <p:nvPr/>
+        </p:nvPicPr>
+        <p:blipFill>
+          <a:blip r:embed="rId3">
+            <a:extLst>
+              <a:ext uri="{28A0092B-C50C-407E-A947-70E740481C1C}">
+                <a14:useLocalDpi xmlns:a14="http://schemas.microsoft.com/office/drawing/2010/main" val="0"/>
+              </a:ext>
+            </a:extLst>
+          </a:blip>
+          <a:stretch>
+            <a:fillRect/>
+          </a:stretch>
+        </p:blipFill>
+        <p:spPr>
+          <a:xfrm>
+            <a:off x="7553831" y="3763452"/>
+            <a:ext cx="962204" cy="962204"/>
+          </a:xfrm>
+          <a:prstGeom prst="rect">
+            <a:avLst/>
+          </a:prstGeom>
+        </p:spPr>
+      </p:pic>
     </p:spTree>
     <p:extLst>
       <p:ext uri="{BB962C8B-B14F-4D97-AF65-F5344CB8AC3E}">

</xml_diff>

<commit_message>
use Web Platform Innovation and Standards
</commit_message>
<xml_diff>
--- a/presentations/jobs/JobOpenings_SingleSlide.pptx
+++ b/presentations/jobs/JobOpenings_SingleSlide.pptx
@@ -5459,8 +5459,17 @@
             </a:pPr>
             <a:r>
               <a:rPr lang="en-US" dirty="0" smtClean="0"/>
-              <a:t>Senior Computer Scientist – Web Standards</a:t>
+              <a:t>Senior Computer Scientist – </a:t>
             </a:r>
+            <a:r>
+              <a:rPr lang="en-US" dirty="0" smtClean="0"/>
+              <a:t>Web Platform Innovation </a:t>
+            </a:r>
+            <a:r>
+              <a:rPr lang="en-US" smtClean="0"/>
+              <a:t>and Standards</a:t>
+            </a:r>
+            <a:endParaRPr lang="en-US" dirty="0" smtClean="0"/>
           </a:p>
           <a:p>
             <a:pPr marL="231775" lvl="1" indent="0">

</xml_diff>